<commit_message>
ajout com dans js
</commit_message>
<xml_diff>
--- a/base de données.pptx
+++ b/base de données.pptx
@@ -105,6 +105,11 @@
       </a:defRPr>
     </a:lvl9pPr>
   </p:defaultTextStyle>
+  <p:extLst>
+    <p:ext uri="{EFAFB233-063F-42B5-8137-9DF3F51BA10A}">
+      <p15:sldGuideLst xmlns:p15="http://schemas.microsoft.com/office/powerpoint/2012/main"/>
+    </p:ext>
+  </p:extLst>
 </p:presentation>
 </file>
 
@@ -255,7 +260,7 @@
           <a:p>
             <a:fld id="{A9D8FF9A-B495-4C1D-BB5F-1FB9EE86129C}" type="datetimeFigureOut">
               <a:rPr lang="fr-FR" smtClean="0"/>
-              <a:t>07/02/2020</a:t>
+              <a:t>09/03/2020</a:t>
             </a:fld>
             <a:endParaRPr lang="fr-FR"/>
           </a:p>
@@ -453,7 +458,7 @@
           <a:p>
             <a:fld id="{A9D8FF9A-B495-4C1D-BB5F-1FB9EE86129C}" type="datetimeFigureOut">
               <a:rPr lang="fr-FR" smtClean="0"/>
-              <a:t>07/02/2020</a:t>
+              <a:t>09/03/2020</a:t>
             </a:fld>
             <a:endParaRPr lang="fr-FR"/>
           </a:p>
@@ -661,7 +666,7 @@
           <a:p>
             <a:fld id="{A9D8FF9A-B495-4C1D-BB5F-1FB9EE86129C}" type="datetimeFigureOut">
               <a:rPr lang="fr-FR" smtClean="0"/>
-              <a:t>07/02/2020</a:t>
+              <a:t>09/03/2020</a:t>
             </a:fld>
             <a:endParaRPr lang="fr-FR"/>
           </a:p>
@@ -859,7 +864,7 @@
           <a:p>
             <a:fld id="{A9D8FF9A-B495-4C1D-BB5F-1FB9EE86129C}" type="datetimeFigureOut">
               <a:rPr lang="fr-FR" smtClean="0"/>
-              <a:t>07/02/2020</a:t>
+              <a:t>09/03/2020</a:t>
             </a:fld>
             <a:endParaRPr lang="fr-FR"/>
           </a:p>
@@ -1134,7 +1139,7 @@
           <a:p>
             <a:fld id="{A9D8FF9A-B495-4C1D-BB5F-1FB9EE86129C}" type="datetimeFigureOut">
               <a:rPr lang="fr-FR" smtClean="0"/>
-              <a:t>07/02/2020</a:t>
+              <a:t>09/03/2020</a:t>
             </a:fld>
             <a:endParaRPr lang="fr-FR"/>
           </a:p>
@@ -1399,7 +1404,7 @@
           <a:p>
             <a:fld id="{A9D8FF9A-B495-4C1D-BB5F-1FB9EE86129C}" type="datetimeFigureOut">
               <a:rPr lang="fr-FR" smtClean="0"/>
-              <a:t>07/02/2020</a:t>
+              <a:t>09/03/2020</a:t>
             </a:fld>
             <a:endParaRPr lang="fr-FR"/>
           </a:p>
@@ -1811,7 +1816,7 @@
           <a:p>
             <a:fld id="{A9D8FF9A-B495-4C1D-BB5F-1FB9EE86129C}" type="datetimeFigureOut">
               <a:rPr lang="fr-FR" smtClean="0"/>
-              <a:t>07/02/2020</a:t>
+              <a:t>09/03/2020</a:t>
             </a:fld>
             <a:endParaRPr lang="fr-FR"/>
           </a:p>
@@ -1952,7 +1957,7 @@
           <a:p>
             <a:fld id="{A9D8FF9A-B495-4C1D-BB5F-1FB9EE86129C}" type="datetimeFigureOut">
               <a:rPr lang="fr-FR" smtClean="0"/>
-              <a:t>07/02/2020</a:t>
+              <a:t>09/03/2020</a:t>
             </a:fld>
             <a:endParaRPr lang="fr-FR"/>
           </a:p>
@@ -2065,7 +2070,7 @@
           <a:p>
             <a:fld id="{A9D8FF9A-B495-4C1D-BB5F-1FB9EE86129C}" type="datetimeFigureOut">
               <a:rPr lang="fr-FR" smtClean="0"/>
-              <a:t>07/02/2020</a:t>
+              <a:t>09/03/2020</a:t>
             </a:fld>
             <a:endParaRPr lang="fr-FR"/>
           </a:p>
@@ -2376,7 +2381,7 @@
           <a:p>
             <a:fld id="{A9D8FF9A-B495-4C1D-BB5F-1FB9EE86129C}" type="datetimeFigureOut">
               <a:rPr lang="fr-FR" smtClean="0"/>
-              <a:t>07/02/2020</a:t>
+              <a:t>09/03/2020</a:t>
             </a:fld>
             <a:endParaRPr lang="fr-FR"/>
           </a:p>
@@ -2664,7 +2669,7 @@
           <a:p>
             <a:fld id="{A9D8FF9A-B495-4C1D-BB5F-1FB9EE86129C}" type="datetimeFigureOut">
               <a:rPr lang="fr-FR" smtClean="0"/>
-              <a:t>07/02/2020</a:t>
+              <a:t>09/03/2020</a:t>
             </a:fld>
             <a:endParaRPr lang="fr-FR"/>
           </a:p>
@@ -2905,7 +2910,7 @@
           <a:p>
             <a:fld id="{A9D8FF9A-B495-4C1D-BB5F-1FB9EE86129C}" type="datetimeFigureOut">
               <a:rPr lang="fr-FR" smtClean="0"/>
-              <a:t>07/02/2020</a:t>
+              <a:t>09/03/2020</a:t>
             </a:fld>
             <a:endParaRPr lang="fr-FR"/>
           </a:p>
@@ -4489,7 +4494,7 @@
         </p:nvSpPr>
         <p:spPr>
           <a:xfrm>
-            <a:off x="1778727" y="487908"/>
+            <a:off x="1547943" y="719129"/>
             <a:ext cx="508473" cy="369332"/>
           </a:xfrm>
           <a:prstGeom prst="rect">
@@ -4524,7 +4529,7 @@
         </p:nvSpPr>
         <p:spPr>
           <a:xfrm>
-            <a:off x="659824" y="2077650"/>
+            <a:off x="411728" y="1730497"/>
             <a:ext cx="508473" cy="369332"/>
           </a:xfrm>
           <a:prstGeom prst="rect">
@@ -4559,7 +4564,7 @@
         </p:nvSpPr>
         <p:spPr>
           <a:xfrm>
-            <a:off x="3256001" y="3127812"/>
+            <a:off x="3499599" y="2964046"/>
             <a:ext cx="476412" cy="369332"/>
           </a:xfrm>
           <a:prstGeom prst="rect">
@@ -4594,7 +4599,7 @@
         </p:nvSpPr>
         <p:spPr>
           <a:xfrm>
-            <a:off x="7199729" y="1553586"/>
+            <a:off x="7527514" y="1307996"/>
             <a:ext cx="508473" cy="369332"/>
           </a:xfrm>
           <a:prstGeom prst="rect">
@@ -4629,7 +4634,7 @@
         </p:nvSpPr>
         <p:spPr>
           <a:xfrm>
-            <a:off x="5944321" y="4793395"/>
+            <a:off x="5584275" y="4883535"/>
             <a:ext cx="508473" cy="369332"/>
           </a:xfrm>
           <a:prstGeom prst="rect">
@@ -4664,7 +4669,7 @@
         </p:nvSpPr>
         <p:spPr>
           <a:xfrm>
-            <a:off x="3992142" y="3905940"/>
+            <a:off x="4179995" y="3452371"/>
             <a:ext cx="508473" cy="369332"/>
           </a:xfrm>
           <a:prstGeom prst="rect">
@@ -4699,7 +4704,7 @@
         </p:nvSpPr>
         <p:spPr>
           <a:xfrm>
-            <a:off x="10129514" y="2360382"/>
+            <a:off x="8763101" y="2380214"/>
             <a:ext cx="508473" cy="369332"/>
           </a:xfrm>
           <a:prstGeom prst="rect">
@@ -4734,7 +4739,7 @@
         </p:nvSpPr>
         <p:spPr>
           <a:xfrm>
-            <a:off x="7187927" y="612644"/>
+            <a:off x="7623843" y="758604"/>
             <a:ext cx="508473" cy="369332"/>
           </a:xfrm>
           <a:prstGeom prst="rect">
@@ -4844,7 +4849,7 @@
         </p:nvSpPr>
         <p:spPr>
           <a:xfrm>
-            <a:off x="4957616" y="1915163"/>
+            <a:off x="4517674" y="2159709"/>
             <a:ext cx="508473" cy="369332"/>
           </a:xfrm>
           <a:prstGeom prst="rect">
@@ -4905,41 +4910,6 @@
           </a:fontRef>
         </p:style>
       </p:cxnSp>
-      <p:sp>
-        <p:nvSpPr>
-          <p:cNvPr id="124" name="ZoneTexte 123">
-            <a:extLst>
-              <a:ext uri="{FF2B5EF4-FFF2-40B4-BE49-F238E27FC236}">
-                <a16:creationId xmlns:a16="http://schemas.microsoft.com/office/drawing/2014/main" id="{E51C9555-A922-4C9D-848F-218BDC1331F7}"/>
-              </a:ext>
-            </a:extLst>
-          </p:cNvPr>
-          <p:cNvSpPr txBox="1"/>
-          <p:nvPr/>
-        </p:nvSpPr>
-        <p:spPr>
-          <a:xfrm>
-            <a:off x="4418870" y="1150833"/>
-            <a:ext cx="508473" cy="369332"/>
-          </a:xfrm>
-          <a:prstGeom prst="rect">
-            <a:avLst/>
-          </a:prstGeom>
-          <a:noFill/>
-        </p:spPr>
-        <p:txBody>
-          <a:bodyPr wrap="none" rtlCol="0">
-            <a:spAutoFit/>
-          </a:bodyPr>
-          <a:lstStyle/>
-          <a:p>
-            <a:r>
-              <a:rPr lang="fr-FR" dirty="0"/>
-              <a:t>0,N</a:t>
-            </a:r>
-          </a:p>
-        </p:txBody>
-      </p:sp>
       <p:sp>
         <p:nvSpPr>
           <p:cNvPr id="144" name="ZoneTexte 143">

</xml_diff>

<commit_message>
creation reu avec nouvelle base
</commit_message>
<xml_diff>
--- a/base de données.pptx
+++ b/base de données.pptx
@@ -260,7 +260,7 @@
           <a:p>
             <a:fld id="{A9D8FF9A-B495-4C1D-BB5F-1FB9EE86129C}" type="datetimeFigureOut">
               <a:rPr lang="fr-FR" smtClean="0"/>
-              <a:t>09/03/2020</a:t>
+              <a:t>19/03/2020</a:t>
             </a:fld>
             <a:endParaRPr lang="fr-FR"/>
           </a:p>
@@ -458,7 +458,7 @@
           <a:p>
             <a:fld id="{A9D8FF9A-B495-4C1D-BB5F-1FB9EE86129C}" type="datetimeFigureOut">
               <a:rPr lang="fr-FR" smtClean="0"/>
-              <a:t>09/03/2020</a:t>
+              <a:t>19/03/2020</a:t>
             </a:fld>
             <a:endParaRPr lang="fr-FR"/>
           </a:p>
@@ -666,7 +666,7 @@
           <a:p>
             <a:fld id="{A9D8FF9A-B495-4C1D-BB5F-1FB9EE86129C}" type="datetimeFigureOut">
               <a:rPr lang="fr-FR" smtClean="0"/>
-              <a:t>09/03/2020</a:t>
+              <a:t>19/03/2020</a:t>
             </a:fld>
             <a:endParaRPr lang="fr-FR"/>
           </a:p>
@@ -864,7 +864,7 @@
           <a:p>
             <a:fld id="{A9D8FF9A-B495-4C1D-BB5F-1FB9EE86129C}" type="datetimeFigureOut">
               <a:rPr lang="fr-FR" smtClean="0"/>
-              <a:t>09/03/2020</a:t>
+              <a:t>19/03/2020</a:t>
             </a:fld>
             <a:endParaRPr lang="fr-FR"/>
           </a:p>
@@ -1139,7 +1139,7 @@
           <a:p>
             <a:fld id="{A9D8FF9A-B495-4C1D-BB5F-1FB9EE86129C}" type="datetimeFigureOut">
               <a:rPr lang="fr-FR" smtClean="0"/>
-              <a:t>09/03/2020</a:t>
+              <a:t>19/03/2020</a:t>
             </a:fld>
             <a:endParaRPr lang="fr-FR"/>
           </a:p>
@@ -1404,7 +1404,7 @@
           <a:p>
             <a:fld id="{A9D8FF9A-B495-4C1D-BB5F-1FB9EE86129C}" type="datetimeFigureOut">
               <a:rPr lang="fr-FR" smtClean="0"/>
-              <a:t>09/03/2020</a:t>
+              <a:t>19/03/2020</a:t>
             </a:fld>
             <a:endParaRPr lang="fr-FR"/>
           </a:p>
@@ -1816,7 +1816,7 @@
           <a:p>
             <a:fld id="{A9D8FF9A-B495-4C1D-BB5F-1FB9EE86129C}" type="datetimeFigureOut">
               <a:rPr lang="fr-FR" smtClean="0"/>
-              <a:t>09/03/2020</a:t>
+              <a:t>19/03/2020</a:t>
             </a:fld>
             <a:endParaRPr lang="fr-FR"/>
           </a:p>
@@ -1957,7 +1957,7 @@
           <a:p>
             <a:fld id="{A9D8FF9A-B495-4C1D-BB5F-1FB9EE86129C}" type="datetimeFigureOut">
               <a:rPr lang="fr-FR" smtClean="0"/>
-              <a:t>09/03/2020</a:t>
+              <a:t>19/03/2020</a:t>
             </a:fld>
             <a:endParaRPr lang="fr-FR"/>
           </a:p>
@@ -2070,7 +2070,7 @@
           <a:p>
             <a:fld id="{A9D8FF9A-B495-4C1D-BB5F-1FB9EE86129C}" type="datetimeFigureOut">
               <a:rPr lang="fr-FR" smtClean="0"/>
-              <a:t>09/03/2020</a:t>
+              <a:t>19/03/2020</a:t>
             </a:fld>
             <a:endParaRPr lang="fr-FR"/>
           </a:p>
@@ -2381,7 +2381,7 @@
           <a:p>
             <a:fld id="{A9D8FF9A-B495-4C1D-BB5F-1FB9EE86129C}" type="datetimeFigureOut">
               <a:rPr lang="fr-FR" smtClean="0"/>
-              <a:t>09/03/2020</a:t>
+              <a:t>19/03/2020</a:t>
             </a:fld>
             <a:endParaRPr lang="fr-FR"/>
           </a:p>
@@ -2669,7 +2669,7 @@
           <a:p>
             <a:fld id="{A9D8FF9A-B495-4C1D-BB5F-1FB9EE86129C}" type="datetimeFigureOut">
               <a:rPr lang="fr-FR" smtClean="0"/>
-              <a:t>09/03/2020</a:t>
+              <a:t>19/03/2020</a:t>
             </a:fld>
             <a:endParaRPr lang="fr-FR"/>
           </a:p>
@@ -2910,7 +2910,7 @@
           <a:p>
             <a:fld id="{A9D8FF9A-B495-4C1D-BB5F-1FB9EE86129C}" type="datetimeFigureOut">
               <a:rPr lang="fr-FR" smtClean="0"/>
-              <a:t>09/03/2020</a:t>
+              <a:t>19/03/2020</a:t>
             </a:fld>
             <a:endParaRPr lang="fr-FR"/>
           </a:p>
@@ -4041,7 +4041,7 @@
         <p:spPr>
           <a:xfrm>
             <a:off x="5979369" y="2012609"/>
-            <a:ext cx="1547345" cy="1238008"/>
+            <a:ext cx="1606828" cy="1274849"/>
           </a:xfrm>
           <a:prstGeom prst="ellipse">
             <a:avLst/>
@@ -4138,8 +4138,8 @@
         </p:nvCxnSpPr>
         <p:spPr>
           <a:xfrm flipV="1">
-            <a:off x="5279739" y="2631613"/>
-            <a:ext cx="699630" cy="347820"/>
+            <a:off x="5279739" y="2650034"/>
+            <a:ext cx="699630" cy="329399"/>
           </a:xfrm>
           <a:prstGeom prst="line">
             <a:avLst/>
@@ -4178,8 +4178,8 @@
         </p:nvCxnSpPr>
         <p:spPr>
           <a:xfrm flipH="1">
-            <a:off x="7526714" y="1206220"/>
-            <a:ext cx="669041" cy="1425393"/>
+            <a:off x="7586197" y="1206220"/>
+            <a:ext cx="609558" cy="1443814"/>
           </a:xfrm>
           <a:prstGeom prst="line">
             <a:avLst/>

</xml_diff>